<commit_message>
yi dai yi lu
</commit_message>
<xml_diff>
--- a/一带一路/一带一路 - 1.pptx
+++ b/一带一路/一带一路 - 1.pptx
@@ -6509,7 +6509,7 @@
         <p:spPr>
           <a:xfrm>
             <a:off x="408191" y="357816"/>
-            <a:ext cx="11359739" cy="2531486"/>
+            <a:ext cx="11359739" cy="4685922"/>
           </a:xfrm>
           <a:prstGeom prst="rect">
             <a:avLst/>
@@ -6762,13 +6762,110 @@
             </a:endParaRPr>
           </a:p>
           <a:p>
-            <a:endParaRPr lang="zh-CN" altLang="en-US" sz="2000" dirty="0">
+            <a:r>
+              <a:rPr lang="zh-CN" altLang="en-US" sz="2000" dirty="0">
+                <a:solidFill>
+                  <a:srgbClr val="763E23"/>
+                </a:solidFill>
+                <a:latin typeface="微软雅黑" panose="020B0503020204020204" pitchFamily="34" charset="-122"/>
+                <a:ea typeface="微软雅黑" panose="020B0503020204020204" pitchFamily="34" charset="-122"/>
+              </a:rPr>
+              <a:t>一，东西汉对西域管理，匈奴每况愈下，一分为二，一部分融入汉朝，一部份向西逃到东欧，击退日耳曼人，日耳曼人最终灭亡了罗马帝国</a:t>
+            </a:r>
+            <a:endParaRPr lang="en-US" altLang="zh-CN" sz="2000" dirty="0">
               <a:solidFill>
                 <a:srgbClr val="763E23"/>
               </a:solidFill>
               <a:latin typeface="微软雅黑" panose="020B0503020204020204" pitchFamily="34" charset="-122"/>
               <a:ea typeface="微软雅黑" panose="020B0503020204020204" pitchFamily="34" charset="-122"/>
             </a:endParaRPr>
+          </a:p>
+          <a:p>
+            <a:endParaRPr lang="en-US" altLang="zh-CN" sz="2000" dirty="0">
+              <a:solidFill>
+                <a:srgbClr val="763E23"/>
+              </a:solidFill>
+              <a:latin typeface="微软雅黑" panose="020B0503020204020204" pitchFamily="34" charset="-122"/>
+              <a:ea typeface="微软雅黑" panose="020B0503020204020204" pitchFamily="34" charset="-122"/>
+            </a:endParaRPr>
+          </a:p>
+          <a:p>
+            <a:r>
+              <a:rPr lang="zh-CN" altLang="en-US" sz="2000" dirty="0">
+                <a:solidFill>
+                  <a:srgbClr val="763E23"/>
+                </a:solidFill>
+                <a:latin typeface="微软雅黑" panose="020B0503020204020204" pitchFamily="34" charset="-122"/>
+                <a:ea typeface="微软雅黑" panose="020B0503020204020204" pitchFamily="34" charset="-122"/>
+              </a:rPr>
+              <a:t>二，为什么意大利米兰是时装之都。古罗马，最早与中国开展商贸的西方帝国。</a:t>
+            </a:r>
+            <a:endParaRPr lang="en-US" altLang="zh-CN" sz="2000" dirty="0">
+              <a:solidFill>
+                <a:srgbClr val="763E23"/>
+              </a:solidFill>
+              <a:latin typeface="微软雅黑" panose="020B0503020204020204" pitchFamily="34" charset="-122"/>
+              <a:ea typeface="微软雅黑" panose="020B0503020204020204" pitchFamily="34" charset="-122"/>
+            </a:endParaRPr>
+          </a:p>
+          <a:p>
+            <a:r>
+              <a:rPr lang="zh-CN" altLang="en-US" sz="2000" dirty="0">
+                <a:solidFill>
+                  <a:srgbClr val="763E23"/>
+                </a:solidFill>
+                <a:latin typeface="微软雅黑" panose="020B0503020204020204" pitchFamily="34" charset="-122"/>
+                <a:ea typeface="微软雅黑" panose="020B0503020204020204" pitchFamily="34" charset="-122"/>
+              </a:rPr>
+              <a:t>丝绸、纺织品，贵族、富豪， 衣服、帘幕材料。</a:t>
+            </a:r>
+            <a:endParaRPr lang="en-US" altLang="zh-CN" sz="2000" dirty="0">
+              <a:solidFill>
+                <a:srgbClr val="763E23"/>
+              </a:solidFill>
+              <a:latin typeface="微软雅黑" panose="020B0503020204020204" pitchFamily="34" charset="-122"/>
+              <a:ea typeface="微软雅黑" panose="020B0503020204020204" pitchFamily="34" charset="-122"/>
+            </a:endParaRPr>
+          </a:p>
+          <a:p>
+            <a:r>
+              <a:rPr lang="zh-CN" altLang="en-US" sz="2000" dirty="0">
+                <a:solidFill>
+                  <a:srgbClr val="763E23"/>
+                </a:solidFill>
+                <a:latin typeface="微软雅黑" panose="020B0503020204020204" pitchFamily="34" charset="-122"/>
+                <a:ea typeface="微软雅黑" panose="020B0503020204020204" pitchFamily="34" charset="-122"/>
+              </a:rPr>
+              <a:t>罗马核心，意大利，服装业和纺织业的优良基础。</a:t>
+            </a:r>
+            <a:endParaRPr lang="en-US" altLang="zh-CN" sz="2000" dirty="0">
+              <a:solidFill>
+                <a:srgbClr val="763E23"/>
+              </a:solidFill>
+              <a:latin typeface="微软雅黑" panose="020B0503020204020204" pitchFamily="34" charset="-122"/>
+              <a:ea typeface="微软雅黑" panose="020B0503020204020204" pitchFamily="34" charset="-122"/>
+            </a:endParaRPr>
+          </a:p>
+          <a:p>
+            <a:endParaRPr lang="en-US" altLang="zh-CN" sz="2000" dirty="0">
+              <a:solidFill>
+                <a:srgbClr val="763E23"/>
+              </a:solidFill>
+              <a:latin typeface="微软雅黑" panose="020B0503020204020204" pitchFamily="34" charset="-122"/>
+              <a:ea typeface="微软雅黑" panose="020B0503020204020204" pitchFamily="34" charset="-122"/>
+            </a:endParaRPr>
+          </a:p>
+          <a:p>
+            <a:r>
+              <a:rPr lang="zh-CN" altLang="en-US" sz="2000" dirty="0">
+                <a:solidFill>
+                  <a:srgbClr val="763E23"/>
+                </a:solidFill>
+                <a:latin typeface="微软雅黑" panose="020B0503020204020204" pitchFamily="34" charset="-122"/>
+                <a:ea typeface="微软雅黑" panose="020B0503020204020204" pitchFamily="34" charset="-122"/>
+              </a:rPr>
+              <a:t>西安为什么没有成为时装之都？</a:t>
+            </a:r>
           </a:p>
         </p:txBody>
       </p:sp>

</xml_diff>